<commit_message>
[Ballistic_Calculator] - Improved dragForce calculation. - Added ability to choose integration method (Euler or RK4). - Implemented drag model selection (G1, G7). - Added Gravity.py module to compute gravity acceleration. - Now results can be displays in the table. - Introduced settings for minimum velocity, altitude, and max distance. - Improved UI layout and parameter input structure. - Updated InterimWorkReport.pptx presentation accordingly.
</commit_message>
<xml_diff>
--- a/Ballistic_Calculator/Reporting/InterimWorkReport.pptx
+++ b/Ballistic_Calculator/Reporting/InterimWorkReport.pptx
@@ -6341,7 +6341,7 @@
           <a:p>
             <a:r>
               <a:rPr lang="ru-RU" sz="2600" dirty="0"/>
-              <a:t>Построить математическую модель полета снаряда под действием факторов влияющих на ее траекторию. На основе нее реализовать программный код для визуализации и проведения расчетов. С помощью программы провести анализ влияния различных факторов на траекторию полета пули.</a:t>
+              <a:t>Построить математическую модель полета снаряда под действием факторов влияющих на его траекторию. На основе нее реализовать программный код для визуализации и проведения расчетов. С помощью программы провести анализ влияния различных факторов на траекторию полета пули.</a:t>
             </a:r>
           </a:p>
         </p:txBody>
@@ -6422,32 +6422,34 @@
         </p:nvSpPr>
         <p:spPr>
           <a:xfrm>
-            <a:off x="238124" y="1268414"/>
-            <a:ext cx="5857875" cy="5045074"/>
+            <a:off x="238125" y="1268414"/>
+            <a:ext cx="5959302" cy="5045074"/>
           </a:xfrm>
         </p:spPr>
         <p:txBody>
-          <a:bodyPr/>
+          <a:bodyPr>
+            <a:normAutofit/>
+          </a:bodyPr>
           <a:lstStyle/>
           <a:p>
             <a:r>
-              <a:rPr lang="ru-RU" dirty="0"/>
-              <a:t>Стрельба — это сложный физический процесс, на который влияет множество факторов.</a:t>
+              <a:rPr lang="ru-RU" sz="2600" dirty="0"/>
+              <a:t>Стрельба — это сложный физический процесс, на который влияет множество различных факторов.</a:t>
             </a:r>
           </a:p>
           <a:p>
-            <a:endParaRPr lang="ru-RU" sz="2400" dirty="0"/>
+            <a:endParaRPr lang="ru-RU" sz="2600" dirty="0"/>
           </a:p>
           <a:p>
             <a:r>
-              <a:rPr lang="ru-RU" dirty="0"/>
-              <a:t>Помимо стандартных сил, как гравитация, ветер и сопротивление воздуха, необходимо учитывать и другие, описание которых с точки зрения физики и дифференциальных уравнений является не тривиальной задачей. </a:t>
+              <a:rPr lang="ru-RU" sz="2600" dirty="0"/>
+              <a:t>Помимо стандартных сил, таких как гравитация, ветер и сопротивление воздуха, необходимо учитывать ряд других воздействий, описание которых с точки зрения физики и дифференциальных уравнений представляет собой нетривиальную задачу.</a:t>
             </a:r>
           </a:p>
         </p:txBody>
       </p:sp>
-      <mc:AlternateContent xmlns:mc="http://schemas.openxmlformats.org/markup-compatibility/2006" xmlns:a14="http://schemas.microsoft.com/office/drawing/2010/main">
-        <mc:Choice Requires="a14">
+      <mc:AlternateContent xmlns:mc="http://schemas.openxmlformats.org/markup-compatibility/2006">
+        <mc:Choice xmlns:a14="http://schemas.microsoft.com/office/drawing/2010/main" Requires="a14">
           <p:sp>
             <p:nvSpPr>
               <p:cNvPr id="4" name="Текст 3">
@@ -6466,8 +6468,8 @@
             </p:nvSpPr>
             <p:spPr>
               <a:xfrm>
-                <a:off x="6220496" y="1268413"/>
-                <a:ext cx="5754016" cy="5045075"/>
+                <a:off x="6095999" y="1268413"/>
+                <a:ext cx="5959302" cy="5045075"/>
               </a:xfrm>
             </p:spPr>
             <p:txBody>
@@ -7095,11 +7097,14 @@
                 </a:r>
                 <a:r>
                   <a:rPr lang="ru-RU" sz="2600" dirty="0">
-                    <a:effectLst/>
                     <a:ea typeface="Times New Roman" panose="02020603050405020304" pitchFamily="18" charset="0"/>
                   </a:rPr>
-                  <a:t>воздействие ветра,</a:t>
+                  <a:t>деривация,</a:t>
                 </a:r>
+                <a:endParaRPr lang="ru-RU" sz="2600" dirty="0">
+                  <a:effectLst/>
+                  <a:ea typeface="Times New Roman" panose="02020603050405020304" pitchFamily="18" charset="0"/>
+                </a:endParaRPr>
               </a:p>
               <a:p>
                 <a:pPr>
@@ -7107,61 +7112,28 @@
                     <a:spcPts val="600"/>
                   </a:spcAft>
                 </a:pPr>
-                <a14:m>
-                  <m:oMath xmlns:m="http://schemas.openxmlformats.org/officeDocument/2006/math">
-                    <m:sSub>
-                      <m:sSubPr>
-                        <m:ctrlPr>
-                          <a:rPr lang="ru-RU" sz="2600" i="1">
-                            <a:effectLst/>
-                            <a:latin typeface="Cambria Math" panose="02040503050406030204" pitchFamily="18" charset="0"/>
-                            <a:ea typeface="Times New Roman" panose="02020603050405020304" pitchFamily="18" charset="0"/>
-                          </a:rPr>
-                        </m:ctrlPr>
-                      </m:sSubPr>
-                      <m:e>
-                        <m:r>
-                          <a:rPr lang="ru-RU" sz="2600" i="1">
-                            <a:effectLst/>
-                            <a:latin typeface="Cambria Math" panose="02040503050406030204" pitchFamily="18" charset="0"/>
-                            <a:ea typeface="Times New Roman" panose="02020603050405020304" pitchFamily="18" charset="0"/>
-                          </a:rPr>
-                          <m:t>𝐹</m:t>
-                        </m:r>
-                      </m:e>
-                      <m:sub>
-                        <m:r>
-                          <a:rPr lang="ru-RU" sz="2600" i="1">
-                            <a:effectLst/>
-                            <a:latin typeface="Cambria Math" panose="02040503050406030204" pitchFamily="18" charset="0"/>
-                            <a:ea typeface="Times New Roman" panose="02020603050405020304" pitchFamily="18" charset="0"/>
-                          </a:rPr>
-                          <m:t>𝑎</m:t>
-                        </m:r>
-                      </m:sub>
-                    </m:sSub>
-                  </m:oMath>
-                </a14:m>
                 <a:r>
                   <a:rPr lang="ru-RU" sz="2600" dirty="0">
-                    <a:effectLst/>
                     <a:latin typeface="Times New Roman" panose="02020603050405020304" pitchFamily="18" charset="0"/>
                     <a:ea typeface="Times New Roman" panose="02020603050405020304" pitchFamily="18" charset="0"/>
                   </a:rPr>
-                  <a:t> — </a:t>
+                  <a:t>… — </a:t>
                 </a:r>
                 <a:r>
                   <a:rPr lang="ru-RU" sz="2600" dirty="0">
-                    <a:effectLst/>
                     <a:ea typeface="Times New Roman" panose="02020603050405020304" pitchFamily="18" charset="0"/>
                   </a:rPr>
-                  <a:t>влияние атмосферных условий.</a:t>
+                  <a:t>другие влияющие силы</a:t>
                 </a:r>
+                <a:endParaRPr lang="ru-RU" sz="2600" dirty="0">
+                  <a:effectLst/>
+                  <a:ea typeface="Times New Roman" panose="02020603050405020304" pitchFamily="18" charset="0"/>
+                </a:endParaRPr>
               </a:p>
             </p:txBody>
           </p:sp>
         </mc:Choice>
-        <mc:Fallback xmlns="">
+        <mc:Fallback>
           <p:sp>
             <p:nvSpPr>
               <p:cNvPr id="4" name="Текст 3">
@@ -7180,13 +7152,13 @@
             </p:nvSpPr>
             <p:spPr>
               <a:xfrm>
-                <a:off x="6220496" y="1268413"/>
-                <a:ext cx="5754016" cy="5045075"/>
+                <a:off x="6095999" y="1268413"/>
+                <a:ext cx="5959302" cy="5045075"/>
               </a:xfrm>
               <a:blipFill>
                 <a:blip r:embed="rId2"/>
                 <a:stretch>
-                  <a:fillRect l="-1589" t="-2174" r="-212" b="-2053"/>
+                  <a:fillRect l="-1534" t="-2174" r="-818"/>
                 </a:stretch>
               </a:blipFill>
             </p:spPr>
@@ -7286,18 +7258,33 @@
           </a:xfrm>
         </p:spPr>
         <p:txBody>
-          <a:bodyPr/>
+          <a:bodyPr>
+            <a:normAutofit fontScale="92500"/>
+          </a:bodyPr>
           <a:lstStyle/>
           <a:p>
             <a:r>
               <a:rPr lang="ru-RU" dirty="0"/>
-              <a:t>Если мы возьмем в рассмотрение гравитацию, ветер и силу сопротивления, то получим систему дифференциальных уравнений, которая зависит от коэффициента сопротивления, плотности воздуха, которая зависит от атмосферных условий, параметров пули и ее скорости относительно ветра.</a:t>
-            </a:r>
+              <a:t>Если взять в рассмотрение только гравитацию, ветер и силу сопротивления, то получим систему дифференциальных уравнений, описывающую движение пули. Система зависит от коэффициента сопротивления, параметров пули</a:t>
+            </a:r>
+            <a:r>
+              <a:rPr lang="en-US" dirty="0"/>
+              <a:t>, </a:t>
+            </a:r>
+            <a:r>
+              <a:rPr lang="ru-RU" dirty="0"/>
+              <a:t>ее скорости относительно ветра и плотности воздуха, зависящей от атмосферных условий</a:t>
+            </a:r>
+            <a:r>
+              <a:rPr lang="en-US" dirty="0"/>
+              <a:t>.</a:t>
+            </a:r>
+            <a:endParaRPr lang="ru-RU" dirty="0"/>
           </a:p>
         </p:txBody>
       </p:sp>
-      <mc:AlternateContent xmlns:mc="http://schemas.openxmlformats.org/markup-compatibility/2006" xmlns:a14="http://schemas.microsoft.com/office/drawing/2010/main">
-        <mc:Choice Requires="a14">
+      <mc:AlternateContent xmlns:mc="http://schemas.openxmlformats.org/markup-compatibility/2006">
+        <mc:Choice xmlns:a14="http://schemas.microsoft.com/office/drawing/2010/main" Requires="a14">
           <p:sp>
             <p:nvSpPr>
               <p:cNvPr id="4" name="Текст 3">
@@ -7316,8 +7303,8 @@
             </p:nvSpPr>
             <p:spPr>
               <a:xfrm>
-                <a:off x="5795493" y="1609859"/>
-                <a:ext cx="6179019" cy="4703629"/>
+                <a:off x="5761823" y="1609859"/>
+                <a:ext cx="6212690" cy="4703629"/>
               </a:xfrm>
             </p:spPr>
             <p:txBody>
@@ -7961,6 +7948,17 @@
                   </a:rPr>
                   <a:t>​ — коэффициент аэродинамического сопротивления</a:t>
                 </a:r>
+                <a:r>
+                  <a:rPr lang="en-US" sz="2400" dirty="0">
+                    <a:effectLst/>
+                    <a:ea typeface="Times New Roman" panose="02020603050405020304" pitchFamily="18" charset="0"/>
+                  </a:rPr>
+                  <a:t>,</a:t>
+                </a:r>
+                <a:endParaRPr lang="ru-RU" sz="2400" dirty="0">
+                  <a:effectLst/>
+                  <a:ea typeface="Times New Roman" panose="02020603050405020304" pitchFamily="18" charset="0"/>
+                </a:endParaRPr>
               </a:p>
               <a:p>
                 <a14:m>
@@ -7991,6 +7989,17 @@
                   </a:rPr>
                   <a:t>— плотность воздуха</a:t>
                 </a:r>
+                <a:r>
+                  <a:rPr lang="en-US" sz="2400" dirty="0">
+                    <a:effectLst/>
+                    <a:ea typeface="Times New Roman" panose="02020603050405020304" pitchFamily="18" charset="0"/>
+                  </a:rPr>
+                  <a:t>,</a:t>
+                </a:r>
+                <a:endParaRPr lang="ru-RU" sz="2400" dirty="0">
+                  <a:effectLst/>
+                  <a:ea typeface="Times New Roman" panose="02020603050405020304" pitchFamily="18" charset="0"/>
+                </a:endParaRPr>
               </a:p>
               <a:p>
                 <a14:m>
@@ -8079,7 +8088,7 @@
             </p:txBody>
           </p:sp>
         </mc:Choice>
-        <mc:Fallback xmlns="">
+        <mc:Fallback>
           <p:sp>
             <p:nvSpPr>
               <p:cNvPr id="4" name="Текст 3">
@@ -8098,13 +8107,13 @@
             </p:nvSpPr>
             <p:spPr>
               <a:xfrm>
-                <a:off x="5795493" y="1609859"/>
-                <a:ext cx="6179019" cy="4703629"/>
+                <a:off x="5761823" y="1609859"/>
+                <a:ext cx="6212690" cy="4703629"/>
               </a:xfrm>
               <a:blipFill>
                 <a:blip r:embed="rId2"/>
                 <a:stretch>
-                  <a:fillRect l="-1579"/>
+                  <a:fillRect l="-1472"/>
                 </a:stretch>
               </a:blipFill>
             </p:spPr>
@@ -8204,12 +8213,22 @@
           </a:xfrm>
         </p:spPr>
         <p:txBody>
-          <a:bodyPr/>
+          <a:bodyPr>
+            <a:normAutofit lnSpcReduction="10000"/>
+          </a:bodyPr>
           <a:lstStyle/>
           <a:p>
             <a:r>
               <a:rPr lang="ru-RU" dirty="0"/>
-              <a:t>Из различных методов численного интегрирования было выбрано два</a:t>
+              <a:t>Для решения системы дифференциальных уравнений</a:t>
+            </a:r>
+            <a:r>
+              <a:rPr lang="en-US" dirty="0"/>
+              <a:t> </a:t>
+            </a:r>
+            <a:r>
+              <a:rPr lang="ru-RU" dirty="0"/>
+              <a:t>из рассмотренных методов численного интегрирования были выбраны два</a:t>
             </a:r>
             <a:r>
               <a:rPr lang="en-US" dirty="0"/>
@@ -8222,8 +8241,20 @@
           </a:p>
           <a:p>
             <a:r>
+              <a:rPr lang="ru-RU" b="1" dirty="0"/>
+              <a:t>Метод Эйлера </a:t>
+            </a:r>
+            <a:r>
               <a:rPr lang="ru-RU" dirty="0"/>
-              <a:t>Метод Эйлера — за счет простоты реализации.</a:t>
+              <a:t>— за счет простоты реализации</a:t>
+            </a:r>
+            <a:r>
+              <a:rPr lang="en-US" dirty="0"/>
+              <a:t> </a:t>
+            </a:r>
+            <a:r>
+              <a:rPr lang="ru-RU" dirty="0"/>
+              <a:t>и наглядности.</a:t>
             </a:r>
             <a:br>
               <a:rPr lang="ru-RU" dirty="0"/>
@@ -8232,8 +8263,12 @@
               <a:rPr lang="ru-RU" dirty="0"/>
             </a:br>
             <a:r>
+              <a:rPr lang="ru-RU" b="1" dirty="0"/>
+              <a:t>Метод Рунге-Кутты 4-го порядка </a:t>
+            </a:r>
+            <a:r>
               <a:rPr lang="ru-RU" dirty="0"/>
-              <a:t>Метод Рунге-Кутты 4-го порядка — за счет высокой точности.</a:t>
+              <a:t>— за счет высокой точности.</a:t>
             </a:r>
           </a:p>
         </p:txBody>
@@ -9923,19 +9958,19 @@
         </p:nvSpPr>
         <p:spPr>
           <a:xfrm>
-            <a:off x="502277" y="1278759"/>
-            <a:ext cx="4979582" cy="5045075"/>
+            <a:off x="414142" y="1278759"/>
+            <a:ext cx="4873954" cy="5045075"/>
           </a:xfrm>
         </p:spPr>
         <p:txBody>
           <a:bodyPr>
-            <a:normAutofit lnSpcReduction="10000"/>
+            <a:normAutofit fontScale="85000" lnSpcReduction="10000"/>
           </a:bodyPr>
           <a:lstStyle/>
           <a:p>
             <a:r>
               <a:rPr lang="ru-RU" dirty="0"/>
-              <a:t>Для предварительной проверки составленных формул и методов решения, была создана программа, которая с помощью заданных параметров рассчитывает траекторию пули и визуализирует результат.</a:t>
+              <a:t>Для предварительной проверки физических моделей и методов численного интегрирования была разработана программа, рассчитывающая траекторию пули и визуализирующая результат.</a:t>
             </a:r>
           </a:p>
           <a:p>
@@ -9944,17 +9979,34 @@
           <a:p>
             <a:r>
               <a:rPr lang="ru-RU" dirty="0"/>
-              <a:t>В расчет также был добавлен учет, давления, температуры и влажности.</a:t>
+              <a:t>В расчете учитываются</a:t>
+            </a:r>
+            <a:r>
+              <a:rPr lang="en-US" dirty="0"/>
+              <a:t>: </a:t>
+            </a:r>
+            <a:r>
+              <a:rPr lang="ru-RU" dirty="0"/>
+              <a:t>начальная скорость, ветер, параметры пули и атмосферные условия.</a:t>
+            </a:r>
+          </a:p>
+          <a:p>
+            <a:endParaRPr lang="ru-RU" dirty="0"/>
+          </a:p>
+          <a:p>
+            <a:r>
+              <a:rPr lang="ru-RU" dirty="0"/>
+              <a:t>Результаты выводятся в качестве графиков или таблицы.</a:t>
             </a:r>
           </a:p>
         </p:txBody>
       </p:sp>
       <p:pic>
         <p:nvPicPr>
-          <p:cNvPr id="7" name="Объект 6">
+          <p:cNvPr id="8" name="Объект 7">
             <a:extLst>
               <a:ext uri="{FF2B5EF4-FFF2-40B4-BE49-F238E27FC236}">
-                <a16:creationId xmlns:a16="http://schemas.microsoft.com/office/drawing/2014/main" id="{A7C57AD7-2272-4712-90AC-E18FD7CF902D}"/>
+                <a16:creationId xmlns:a16="http://schemas.microsoft.com/office/drawing/2014/main" id="{3EABB2A6-E9D8-444C-973F-81280082E1A3}"/>
               </a:ext>
             </a:extLst>
           </p:cNvPr>
@@ -9973,8 +10025,8 @@
         </p:blipFill>
         <p:spPr>
           <a:xfrm>
-            <a:off x="5398265" y="1630331"/>
-            <a:ext cx="6647060" cy="4693503"/>
+            <a:off x="5210978" y="1403720"/>
+            <a:ext cx="6808712" cy="4920114"/>
           </a:xfrm>
           <a:ln>
             <a:solidFill>
@@ -10069,11 +10121,11 @@
           <a:p>
             <a:r>
               <a:rPr lang="ru-RU" b="1" dirty="0"/>
-              <a:t>Расширение визуализации</a:t>
+              <a:t>Реализация режима наведения</a:t>
             </a:r>
             <a:r>
               <a:rPr lang="ru-RU" dirty="0"/>
-              <a:t>: добавление новых форм представления данных, включая таблицы с параметрами пули на разных участках траектории.</a:t>
+              <a:t>: разработка функционала, при котором программа будет итеративно подбирать угол вылета для попадания в заданную цель — как статичную, так и движущуюся.</a:t>
             </a:r>
           </a:p>
           <a:p>
@@ -10082,11 +10134,11 @@
           <a:p>
             <a:r>
               <a:rPr lang="ru-RU" b="1" dirty="0"/>
-              <a:t>Реализация режима наведения</a:t>
+              <a:t>Расширение функционала</a:t>
             </a:r>
             <a:r>
               <a:rPr lang="ru-RU" dirty="0"/>
-              <a:t>: разработка функционала, при котором программа будет итеративно подбирать угол вылета для попадания в заданную цель — как статичную, так и движущуюся.</a:t>
+              <a:t>: общая доработка возможностей программы для удобства анализа и моделирования.</a:t>
             </a:r>
           </a:p>
           <a:p>

</xml_diff>